<commit_message>
Created Layout for UI
</commit_message>
<xml_diff>
--- a/documentation/COMPASS Project Status Document.pptx
+++ b/documentation/COMPASS Project Status Document.pptx
@@ -16,22 +16,24 @@
     <p:sldId id="260" r:id="rId10"/>
     <p:sldId id="284" r:id="rId11"/>
     <p:sldId id="267" r:id="rId12"/>
-    <p:sldId id="270" r:id="rId13"/>
-    <p:sldId id="269" r:id="rId14"/>
-    <p:sldId id="272" r:id="rId15"/>
-    <p:sldId id="273" r:id="rId16"/>
-    <p:sldId id="274" r:id="rId17"/>
-    <p:sldId id="262" r:id="rId18"/>
-    <p:sldId id="283" r:id="rId19"/>
-    <p:sldId id="263" r:id="rId20"/>
-    <p:sldId id="264" r:id="rId21"/>
-    <p:sldId id="265" r:id="rId22"/>
-    <p:sldId id="266" r:id="rId23"/>
-    <p:sldId id="268" r:id="rId24"/>
-    <p:sldId id="282" r:id="rId25"/>
-    <p:sldId id="279" r:id="rId26"/>
-    <p:sldId id="280" r:id="rId27"/>
-    <p:sldId id="281" r:id="rId28"/>
+    <p:sldId id="285" r:id="rId13"/>
+    <p:sldId id="286" r:id="rId14"/>
+    <p:sldId id="270" r:id="rId15"/>
+    <p:sldId id="269" r:id="rId16"/>
+    <p:sldId id="272" r:id="rId17"/>
+    <p:sldId id="273" r:id="rId18"/>
+    <p:sldId id="274" r:id="rId19"/>
+    <p:sldId id="262" r:id="rId20"/>
+    <p:sldId id="283" r:id="rId21"/>
+    <p:sldId id="263" r:id="rId22"/>
+    <p:sldId id="264" r:id="rId23"/>
+    <p:sldId id="265" r:id="rId24"/>
+    <p:sldId id="266" r:id="rId25"/>
+    <p:sldId id="268" r:id="rId26"/>
+    <p:sldId id="282" r:id="rId27"/>
+    <p:sldId id="279" r:id="rId28"/>
+    <p:sldId id="280" r:id="rId29"/>
+    <p:sldId id="281" r:id="rId30"/>
   </p:sldIdLst>
   <p:sldSz cx="12192000" cy="6858000"/>
   <p:notesSz cx="6858000" cy="9144000"/>
@@ -273,7 +275,7 @@
           <a:p>
             <a:fld id="{D0DF073F-56A8-41CB-8F3B-DCDF77E78F60}" type="datetimeFigureOut">
               <a:rPr lang="en-US" smtClean="0"/>
-              <a:t>8/14/2017</a:t>
+              <a:t>8/17/2017</a:t>
             </a:fld>
             <a:endParaRPr lang="en-US"/>
           </a:p>
@@ -443,7 +445,7 @@
           <a:p>
             <a:fld id="{D0DF073F-56A8-41CB-8F3B-DCDF77E78F60}" type="datetimeFigureOut">
               <a:rPr lang="en-US" smtClean="0"/>
-              <a:t>8/14/2017</a:t>
+              <a:t>8/17/2017</a:t>
             </a:fld>
             <a:endParaRPr lang="en-US"/>
           </a:p>
@@ -623,7 +625,7 @@
           <a:p>
             <a:fld id="{D0DF073F-56A8-41CB-8F3B-DCDF77E78F60}" type="datetimeFigureOut">
               <a:rPr lang="en-US" smtClean="0"/>
-              <a:t>8/14/2017</a:t>
+              <a:t>8/17/2017</a:t>
             </a:fld>
             <a:endParaRPr lang="en-US"/>
           </a:p>
@@ -793,7 +795,7 @@
           <a:p>
             <a:fld id="{D0DF073F-56A8-41CB-8F3B-DCDF77E78F60}" type="datetimeFigureOut">
               <a:rPr lang="en-US" smtClean="0"/>
-              <a:t>8/14/2017</a:t>
+              <a:t>8/17/2017</a:t>
             </a:fld>
             <a:endParaRPr lang="en-US"/>
           </a:p>
@@ -1039,7 +1041,7 @@
           <a:p>
             <a:fld id="{D0DF073F-56A8-41CB-8F3B-DCDF77E78F60}" type="datetimeFigureOut">
               <a:rPr lang="en-US" smtClean="0"/>
-              <a:t>8/14/2017</a:t>
+              <a:t>8/17/2017</a:t>
             </a:fld>
             <a:endParaRPr lang="en-US"/>
           </a:p>
@@ -1271,7 +1273,7 @@
           <a:p>
             <a:fld id="{D0DF073F-56A8-41CB-8F3B-DCDF77E78F60}" type="datetimeFigureOut">
               <a:rPr lang="en-US" smtClean="0"/>
-              <a:t>8/14/2017</a:t>
+              <a:t>8/17/2017</a:t>
             </a:fld>
             <a:endParaRPr lang="en-US"/>
           </a:p>
@@ -1638,7 +1640,7 @@
           <a:p>
             <a:fld id="{D0DF073F-56A8-41CB-8F3B-DCDF77E78F60}" type="datetimeFigureOut">
               <a:rPr lang="en-US" smtClean="0"/>
-              <a:t>8/14/2017</a:t>
+              <a:t>8/17/2017</a:t>
             </a:fld>
             <a:endParaRPr lang="en-US"/>
           </a:p>
@@ -1756,7 +1758,7 @@
           <a:p>
             <a:fld id="{D0DF073F-56A8-41CB-8F3B-DCDF77E78F60}" type="datetimeFigureOut">
               <a:rPr lang="en-US" smtClean="0"/>
-              <a:t>8/14/2017</a:t>
+              <a:t>8/17/2017</a:t>
             </a:fld>
             <a:endParaRPr lang="en-US"/>
           </a:p>
@@ -1851,7 +1853,7 @@
           <a:p>
             <a:fld id="{D0DF073F-56A8-41CB-8F3B-DCDF77E78F60}" type="datetimeFigureOut">
               <a:rPr lang="en-US" smtClean="0"/>
-              <a:t>8/14/2017</a:t>
+              <a:t>8/17/2017</a:t>
             </a:fld>
             <a:endParaRPr lang="en-US"/>
           </a:p>
@@ -2128,7 +2130,7 @@
           <a:p>
             <a:fld id="{D0DF073F-56A8-41CB-8F3B-DCDF77E78F60}" type="datetimeFigureOut">
               <a:rPr lang="en-US" smtClean="0"/>
-              <a:t>8/14/2017</a:t>
+              <a:t>8/17/2017</a:t>
             </a:fld>
             <a:endParaRPr lang="en-US"/>
           </a:p>
@@ -2385,7 +2387,7 @@
           <a:p>
             <a:fld id="{D0DF073F-56A8-41CB-8F3B-DCDF77E78F60}" type="datetimeFigureOut">
               <a:rPr lang="en-US" smtClean="0"/>
-              <a:t>8/14/2017</a:t>
+              <a:t>8/17/2017</a:t>
             </a:fld>
             <a:endParaRPr lang="en-US"/>
           </a:p>
@@ -2598,7 +2600,7 @@
           <a:p>
             <a:fld id="{D0DF073F-56A8-41CB-8F3B-DCDF77E78F60}" type="datetimeFigureOut">
               <a:rPr lang="en-US" smtClean="0"/>
-              <a:t>8/14/2017</a:t>
+              <a:t>8/17/2017</a:t>
             </a:fld>
             <a:endParaRPr lang="en-US"/>
           </a:p>
@@ -3320,7 +3322,7 @@
         <p:spPr/>
         <p:txBody>
           <a:bodyPr>
-            <a:normAutofit fontScale="92500" lnSpcReduction="10000"/>
+            <a:normAutofit fontScale="70000" lnSpcReduction="20000"/>
           </a:bodyPr>
           <a:lstStyle/>
           <a:p>
@@ -3344,7 +3346,25 @@
           <a:p>
             <a:r>
               <a:rPr lang="en-US" dirty="0"/>
-              <a:t>User can load an RSO model, TLE, and time-stamped photometry curve and the program will attempt to reconstruct the RSO’s orientation/rotation. It will produce a visual rendering of the RSO based on the input data. </a:t>
+              <a:t>User can load an RSO model, TLE, and time-stamped photometry curve and the program will attempt to reconstruct the RSO’s orientation/rotation. It will produce a visual rendering of the RSO based on the input data.</a:t>
+            </a:r>
+          </a:p>
+          <a:p>
+            <a:r>
+              <a:rPr lang="en-US" dirty="0"/>
+              <a:t>Display a warning if Earth would be obstructing the view </a:t>
+            </a:r>
+          </a:p>
+          <a:p>
+            <a:r>
+              <a:rPr lang="en-US" dirty="0"/>
+              <a:t>Manual Mode: No data collection, just show real time graph and allow user to manipulate the attitude of the spacecraft and angle of light</a:t>
+            </a:r>
+          </a:p>
+          <a:p>
+            <a:r>
+              <a:rPr lang="en-US" dirty="0"/>
+              <a:t>Playback Mode: Save warnings in Sim Data, Output warnings to console during playback (e.g. View may be obstructed by earth or observation during day time)</a:t>
             </a:r>
           </a:p>
           <a:p>
@@ -3462,6 +3482,601 @@
           <a:p>
             <a:r>
               <a:rPr lang="en-US" dirty="0"/>
+              <a:t>User Interface – Controls List</a:t>
+            </a:r>
+          </a:p>
+        </p:txBody>
+      </p:sp>
+      <p:sp>
+        <p:nvSpPr>
+          <p:cNvPr id="3" name="Content Placeholder 2"/>
+          <p:cNvSpPr>
+            <a:spLocks noGrp="1"/>
+          </p:cNvSpPr>
+          <p:nvPr>
+            <p:ph idx="1"/>
+          </p:nvPr>
+        </p:nvSpPr>
+        <p:spPr>
+          <a:xfrm>
+            <a:off x="838200" y="1302326"/>
+            <a:ext cx="10515600" cy="5555674"/>
+          </a:xfrm>
+        </p:spPr>
+        <p:txBody>
+          <a:bodyPr>
+            <a:normAutofit fontScale="47500" lnSpcReduction="20000"/>
+          </a:bodyPr>
+          <a:lstStyle/>
+          <a:p>
+            <a:pPr marL="0" indent="0">
+              <a:buNone/>
+            </a:pPr>
+            <a:r>
+              <a:rPr lang="en-US" dirty="0"/>
+              <a:t>Use a Scrollable Area with a QT Toolbox? Use tabs as well if too much… Disabled invalid options based on settings using </a:t>
+            </a:r>
+            <a:r>
+              <a:rPr lang="en-US" i="1" dirty="0" err="1"/>
+              <a:t>setDisabled</a:t>
+            </a:r>
+            <a:r>
+              <a:rPr lang="en-US" i="1" dirty="0"/>
+              <a:t>(true)</a:t>
+            </a:r>
+            <a:endParaRPr lang="en-US" dirty="0"/>
+          </a:p>
+          <a:p>
+            <a:r>
+              <a:rPr lang="en-US" dirty="0"/>
+              <a:t>General Commands (Not in a Tab/Toolbox, always available)</a:t>
+            </a:r>
+          </a:p>
+          <a:p>
+            <a:pPr lvl="1"/>
+            <a:r>
+              <a:rPr lang="en-US" dirty="0"/>
+              <a:t>Run</a:t>
+            </a:r>
+          </a:p>
+          <a:p>
+            <a:pPr lvl="1"/>
+            <a:r>
+              <a:rPr lang="en-US" dirty="0"/>
+              <a:t>Reset Camera</a:t>
+            </a:r>
+          </a:p>
+          <a:p>
+            <a:pPr lvl="1"/>
+            <a:r>
+              <a:rPr lang="en-US" dirty="0"/>
+              <a:t>Stop</a:t>
+            </a:r>
+          </a:p>
+          <a:p>
+            <a:pPr lvl="1"/>
+            <a:r>
+              <a:rPr lang="en-US" dirty="0"/>
+              <a:t>Exit</a:t>
+            </a:r>
+          </a:p>
+          <a:p>
+            <a:r>
+              <a:rPr lang="en-US" dirty="0"/>
+              <a:t>Settings</a:t>
+            </a:r>
+          </a:p>
+          <a:p>
+            <a:pPr lvl="1"/>
+            <a:r>
+              <a:rPr lang="en-US" dirty="0"/>
+              <a:t>Playback Mode, Simulation Mode , Graph Mode, reconstruction mode (Generate attitude, or shape, or whatever…) (Radio Buttons)</a:t>
+            </a:r>
+          </a:p>
+          <a:p>
+            <a:pPr lvl="1"/>
+            <a:r>
+              <a:rPr lang="en-US" dirty="0"/>
+              <a:t>OSCOM Mode, Photometry Mode (Radio Button Pair)</a:t>
+            </a:r>
+          </a:p>
+          <a:p>
+            <a:pPr lvl="1"/>
+            <a:r>
+              <a:rPr lang="en-US" dirty="0"/>
+              <a:t>Real-Time, Back-End (Radio Button Pair)</a:t>
+            </a:r>
+          </a:p>
+          <a:p>
+            <a:pPr lvl="1"/>
+            <a:r>
+              <a:rPr lang="en-US" dirty="0"/>
+              <a:t>Run From  Simulation Parameters or From Manual Settings (Radio Button Pair)</a:t>
+            </a:r>
+          </a:p>
+          <a:p>
+            <a:pPr lvl="1"/>
+            <a:r>
+              <a:rPr lang="en-US" dirty="0"/>
+              <a:t>Allow User to move camera (Check box)</a:t>
+            </a:r>
+          </a:p>
+          <a:p>
+            <a:r>
+              <a:rPr lang="en-US" dirty="0"/>
+              <a:t>Run Parameters: </a:t>
+            </a:r>
+          </a:p>
+          <a:p>
+            <a:pPr lvl="1"/>
+            <a:r>
+              <a:rPr lang="en-US" dirty="0"/>
+              <a:t>TLE (Paste in Line or satellite number in line or new window to search by name) </a:t>
+            </a:r>
+          </a:p>
+          <a:p>
+            <a:pPr lvl="1"/>
+            <a:r>
+              <a:rPr lang="en-US" dirty="0"/>
+              <a:t>Observer Location (Geo Coordinates)</a:t>
+            </a:r>
+          </a:p>
+          <a:p>
+            <a:pPr lvl="1"/>
+            <a:r>
+              <a:rPr lang="en-US" dirty="0"/>
+              <a:t>Time of observation J-Date (Have a widget for Date and time? And a line for Epoch entry)</a:t>
+            </a:r>
+          </a:p>
+          <a:p>
+            <a:pPr lvl="1"/>
+            <a:r>
+              <a:rPr lang="en-US" dirty="0"/>
+              <a:t>Rotation vector/amount (Automatically fill when user rotates satellite)</a:t>
+            </a:r>
+          </a:p>
+          <a:p>
+            <a:pPr lvl="1"/>
+            <a:r>
+              <a:rPr lang="en-US" dirty="0"/>
+              <a:t>Angular velocity (Vector/amount)</a:t>
+            </a:r>
+          </a:p>
+          <a:p>
+            <a:pPr lvl="1"/>
+            <a:r>
+              <a:rPr lang="en-US" dirty="0"/>
+              <a:t>Light position (Manual setting when TLE and observer location not used)</a:t>
+            </a:r>
+          </a:p>
+          <a:p>
+            <a:pPr lvl="1"/>
+            <a:r>
+              <a:rPr lang="en-US" dirty="0"/>
+              <a:t>Altitude (Manual Setting) (ALLOW MANUAL SETTINGS TO BE EDITABLE DURING A SIMULATION RUN) (Default position, slider in middle. Move left to increase altitude)</a:t>
+            </a:r>
+          </a:p>
+          <a:p>
+            <a:pPr lvl="1"/>
+            <a:r>
+              <a:rPr lang="en-US" dirty="0"/>
+              <a:t>Pass Duration (No pass duration when manual. SIM DATA NOT RECORDED WHEN IN MANUAL MODE)</a:t>
+            </a:r>
+          </a:p>
+          <a:p>
+            <a:r>
+              <a:rPr lang="en-US" dirty="0"/>
+              <a:t>Playback Options – Autofill run parameters?</a:t>
+            </a:r>
+          </a:p>
+          <a:p>
+            <a:pPr lvl="1"/>
+            <a:r>
+              <a:rPr lang="en-US" dirty="0"/>
+              <a:t>Load Simulation Data (Have a combo box at the data directory and a browse button)</a:t>
+            </a:r>
+          </a:p>
+          <a:p>
+            <a:pPr lvl="1"/>
+            <a:r>
+              <a:rPr lang="en-US" dirty="0"/>
+              <a:t>Playback Speed (Slider)?</a:t>
+            </a:r>
+          </a:p>
+          <a:p>
+            <a:pPr lvl="1"/>
+            <a:r>
+              <a:rPr lang="en-US" dirty="0"/>
+              <a:t>Start time (J-Date time or relative time in recording), end time (Slider with exact numbers below in J-Date and Relative)</a:t>
+            </a:r>
+          </a:p>
+        </p:txBody>
+      </p:sp>
+      <p:pic>
+        <p:nvPicPr>
+          <p:cNvPr id="4" name="Picture 3"/>
+          <p:cNvPicPr>
+            <a:picLocks noChangeAspect="1"/>
+          </p:cNvPicPr>
+          <p:nvPr/>
+        </p:nvPicPr>
+        <p:blipFill>
+          <a:blip r:embed="rId2">
+            <a:extLst>
+              <a:ext uri="{28A0092B-C50C-407E-A947-70E740481C1C}">
+                <a14:useLocalDpi xmlns:a14="http://schemas.microsoft.com/office/drawing/2010/main" val="0"/>
+              </a:ext>
+            </a:extLst>
+          </a:blip>
+          <a:stretch>
+            <a:fillRect/>
+          </a:stretch>
+        </p:blipFill>
+        <p:spPr>
+          <a:xfrm>
+            <a:off x="10416742" y="5822874"/>
+            <a:ext cx="1775258" cy="1035126"/>
+          </a:xfrm>
+          <a:prstGeom prst="rect">
+            <a:avLst/>
+          </a:prstGeom>
+        </p:spPr>
+      </p:pic>
+      <p:pic>
+        <p:nvPicPr>
+          <p:cNvPr id="5" name="Picture 4"/>
+          <p:cNvPicPr>
+            <a:picLocks noChangeAspect="1"/>
+          </p:cNvPicPr>
+          <p:nvPr/>
+        </p:nvPicPr>
+        <p:blipFill>
+          <a:blip r:embed="rId3">
+            <a:extLst>
+              <a:ext uri="{28A0092B-C50C-407E-A947-70E740481C1C}">
+                <a14:useLocalDpi xmlns:a14="http://schemas.microsoft.com/office/drawing/2010/main" val="0"/>
+              </a:ext>
+            </a:extLst>
+          </a:blip>
+          <a:stretch>
+            <a:fillRect/>
+          </a:stretch>
+        </p:blipFill>
+        <p:spPr>
+          <a:xfrm>
+            <a:off x="10501312" y="0"/>
+            <a:ext cx="1690688" cy="1690688"/>
+          </a:xfrm>
+          <a:prstGeom prst="rect">
+            <a:avLst/>
+          </a:prstGeom>
+        </p:spPr>
+      </p:pic>
+    </p:spTree>
+    <p:extLst>
+      <p:ext uri="{BB962C8B-B14F-4D97-AF65-F5344CB8AC3E}">
+        <p14:creationId xmlns:p14="http://schemas.microsoft.com/office/powerpoint/2010/main" val="1185872232"/>
+      </p:ext>
+    </p:extLst>
+  </p:cSld>
+  <p:clrMapOvr>
+    <a:masterClrMapping/>
+  </p:clrMapOvr>
+</p:sld>
+</file>
+
+<file path=ppt/slides/slide13.xml><?xml version="1.0" encoding="utf-8"?>
+<p:sld xmlns:a="http://schemas.openxmlformats.org/drawingml/2006/main" xmlns:r="http://schemas.openxmlformats.org/officeDocument/2006/relationships" xmlns:p="http://schemas.openxmlformats.org/presentationml/2006/main">
+  <p:cSld>
+    <p:spTree>
+      <p:nvGrpSpPr>
+        <p:cNvPr id="1" name=""/>
+        <p:cNvGrpSpPr/>
+        <p:nvPr/>
+      </p:nvGrpSpPr>
+      <p:grpSpPr>
+        <a:xfrm>
+          <a:off x="0" y="0"/>
+          <a:ext cx="0" cy="0"/>
+          <a:chOff x="0" y="0"/>
+          <a:chExt cx="0" cy="0"/>
+        </a:xfrm>
+      </p:grpSpPr>
+      <p:sp>
+        <p:nvSpPr>
+          <p:cNvPr id="2" name="Title 1"/>
+          <p:cNvSpPr>
+            <a:spLocks noGrp="1"/>
+          </p:cNvSpPr>
+          <p:nvPr>
+            <p:ph type="title"/>
+          </p:nvPr>
+        </p:nvSpPr>
+        <p:spPr/>
+        <p:txBody>
+          <a:bodyPr/>
+          <a:lstStyle/>
+          <a:p>
+            <a:r>
+              <a:rPr lang="en-US" dirty="0"/>
+              <a:t>User Interface – Controls List</a:t>
+            </a:r>
+          </a:p>
+        </p:txBody>
+      </p:sp>
+      <p:sp>
+        <p:nvSpPr>
+          <p:cNvPr id="3" name="Content Placeholder 2"/>
+          <p:cNvSpPr>
+            <a:spLocks noGrp="1"/>
+          </p:cNvSpPr>
+          <p:nvPr>
+            <p:ph idx="1"/>
+          </p:nvPr>
+        </p:nvSpPr>
+        <p:spPr>
+          <a:xfrm>
+            <a:off x="838200" y="1302326"/>
+            <a:ext cx="10515600" cy="5555674"/>
+          </a:xfrm>
+        </p:spPr>
+        <p:txBody>
+          <a:bodyPr>
+            <a:normAutofit fontScale="70000" lnSpcReduction="20000"/>
+          </a:bodyPr>
+          <a:lstStyle/>
+          <a:p>
+            <a:r>
+              <a:rPr lang="en-US" dirty="0"/>
+              <a:t>Satellite Options</a:t>
+            </a:r>
+          </a:p>
+          <a:p>
+            <a:pPr lvl="1"/>
+            <a:r>
+              <a:rPr lang="en-US" dirty="0"/>
+              <a:t>Satellite Selection (Combo Box) (Selects the folder name)</a:t>
+            </a:r>
+          </a:p>
+          <a:p>
+            <a:pPr lvl="1"/>
+            <a:r>
+              <a:rPr lang="en-US" dirty="0"/>
+              <a:t>Configuration Selection (Combo Box) (Selects the configuration (model) within the folder)</a:t>
+            </a:r>
+          </a:p>
+          <a:p>
+            <a:pPr lvl="1"/>
+            <a:r>
+              <a:rPr lang="en-US" dirty="0"/>
+              <a:t>AddSat button (Add configurations as well)</a:t>
+            </a:r>
+          </a:p>
+          <a:p>
+            <a:pPr lvl="1"/>
+            <a:r>
+              <a:rPr lang="en-US" dirty="0"/>
+              <a:t>Add other config options as necessary…</a:t>
+            </a:r>
+          </a:p>
+          <a:p>
+            <a:pPr lvl="1"/>
+            <a:r>
+              <a:rPr lang="en-US" dirty="0"/>
+              <a:t>Maintain info on the satellite number (for finding TLE) and other Stats in File! Display information about it</a:t>
+            </a:r>
+          </a:p>
+          <a:p>
+            <a:pPr lvl="1"/>
+            <a:endParaRPr lang="en-US" dirty="0"/>
+          </a:p>
+          <a:p>
+            <a:r>
+              <a:rPr lang="en-US" dirty="0"/>
+              <a:t>Graph Options</a:t>
+            </a:r>
+          </a:p>
+          <a:p>
+            <a:pPr lvl="1"/>
+            <a:r>
+              <a:rPr lang="en-US" dirty="0"/>
+              <a:t>Select Data (Combo Box when in Graph Mode)</a:t>
+            </a:r>
+          </a:p>
+          <a:p>
+            <a:pPr lvl="1"/>
+            <a:r>
+              <a:rPr lang="en-US" dirty="0"/>
+              <a:t>Set Scale Manually (Slider and numbers)</a:t>
+            </a:r>
+          </a:p>
+          <a:p>
+            <a:pPr lvl="1"/>
+            <a:r>
+              <a:rPr lang="en-US" dirty="0"/>
+              <a:t>Hide Connecting Lines (Check Box)</a:t>
+            </a:r>
+          </a:p>
+          <a:p>
+            <a:pPr lvl="1"/>
+            <a:r>
+              <a:rPr lang="en-US" dirty="0"/>
+              <a:t>Spline mode??</a:t>
+            </a:r>
+          </a:p>
+          <a:p>
+            <a:pPr lvl="1"/>
+            <a:r>
+              <a:rPr lang="en-US" dirty="0"/>
+              <a:t>Add more as necessary</a:t>
+            </a:r>
+          </a:p>
+          <a:p>
+            <a:r>
+              <a:rPr lang="en-US" dirty="0"/>
+              <a:t>Reconstruction Settings</a:t>
+            </a:r>
+          </a:p>
+          <a:p>
+            <a:pPr lvl="1"/>
+            <a:r>
+              <a:rPr lang="en-US" dirty="0"/>
+              <a:t>User Defined Satellite or shape estimation (Radio Buttons)</a:t>
+            </a:r>
+          </a:p>
+          <a:p>
+            <a:pPr lvl="1"/>
+            <a:r>
+              <a:rPr lang="en-US" dirty="0"/>
+              <a:t>Load Simulation Data (Combo Box or Browse)</a:t>
+            </a:r>
+          </a:p>
+          <a:p>
+            <a:pPr lvl="1"/>
+            <a:r>
+              <a:rPr lang="en-US" dirty="0"/>
+              <a:t>Start Time/End time (Default to entire simulation) (Slider and text)</a:t>
+            </a:r>
+          </a:p>
+          <a:p>
+            <a:r>
+              <a:rPr lang="en-US" dirty="0"/>
+              <a:t>Telescope Parameters</a:t>
+            </a:r>
+          </a:p>
+          <a:p>
+            <a:pPr lvl="1"/>
+            <a:r>
+              <a:rPr lang="en-US" dirty="0"/>
+              <a:t>Worry about this later…. Magnification, Distortion Coefficients, aspect ratio, etc.</a:t>
+            </a:r>
+          </a:p>
+          <a:p>
+            <a:pPr lvl="1"/>
+            <a:r>
+              <a:rPr lang="en-US" dirty="0"/>
+              <a:t>Sample Rate</a:t>
+            </a:r>
+          </a:p>
+          <a:p>
+            <a:pPr marL="0" indent="0">
+              <a:buNone/>
+            </a:pPr>
+            <a:endParaRPr lang="en-US" dirty="0"/>
+          </a:p>
+          <a:p>
+            <a:pPr lvl="1"/>
+            <a:endParaRPr lang="en-US" dirty="0"/>
+          </a:p>
+        </p:txBody>
+      </p:sp>
+      <p:pic>
+        <p:nvPicPr>
+          <p:cNvPr id="4" name="Picture 3"/>
+          <p:cNvPicPr>
+            <a:picLocks noChangeAspect="1"/>
+          </p:cNvPicPr>
+          <p:nvPr/>
+        </p:nvPicPr>
+        <p:blipFill>
+          <a:blip r:embed="rId2">
+            <a:extLst>
+              <a:ext uri="{28A0092B-C50C-407E-A947-70E740481C1C}">
+                <a14:useLocalDpi xmlns:a14="http://schemas.microsoft.com/office/drawing/2010/main" val="0"/>
+              </a:ext>
+            </a:extLst>
+          </a:blip>
+          <a:stretch>
+            <a:fillRect/>
+          </a:stretch>
+        </p:blipFill>
+        <p:spPr>
+          <a:xfrm>
+            <a:off x="10416742" y="5822874"/>
+            <a:ext cx="1775258" cy="1035126"/>
+          </a:xfrm>
+          <a:prstGeom prst="rect">
+            <a:avLst/>
+          </a:prstGeom>
+        </p:spPr>
+      </p:pic>
+      <p:pic>
+        <p:nvPicPr>
+          <p:cNvPr id="5" name="Picture 4"/>
+          <p:cNvPicPr>
+            <a:picLocks noChangeAspect="1"/>
+          </p:cNvPicPr>
+          <p:nvPr/>
+        </p:nvPicPr>
+        <p:blipFill>
+          <a:blip r:embed="rId3">
+            <a:extLst>
+              <a:ext uri="{28A0092B-C50C-407E-A947-70E740481C1C}">
+                <a14:useLocalDpi xmlns:a14="http://schemas.microsoft.com/office/drawing/2010/main" val="0"/>
+              </a:ext>
+            </a:extLst>
+          </a:blip>
+          <a:stretch>
+            <a:fillRect/>
+          </a:stretch>
+        </p:blipFill>
+        <p:spPr>
+          <a:xfrm>
+            <a:off x="10501312" y="0"/>
+            <a:ext cx="1690688" cy="1690688"/>
+          </a:xfrm>
+          <a:prstGeom prst="rect">
+            <a:avLst/>
+          </a:prstGeom>
+        </p:spPr>
+      </p:pic>
+    </p:spTree>
+    <p:extLst>
+      <p:ext uri="{BB962C8B-B14F-4D97-AF65-F5344CB8AC3E}">
+        <p14:creationId xmlns:p14="http://schemas.microsoft.com/office/powerpoint/2010/main" val="3011247030"/>
+      </p:ext>
+    </p:extLst>
+  </p:cSld>
+  <p:clrMapOvr>
+    <a:masterClrMapping/>
+  </p:clrMapOvr>
+</p:sld>
+</file>
+
+<file path=ppt/slides/slide14.xml><?xml version="1.0" encoding="utf-8"?>
+<p:sld xmlns:a="http://schemas.openxmlformats.org/drawingml/2006/main" xmlns:r="http://schemas.openxmlformats.org/officeDocument/2006/relationships" xmlns:p="http://schemas.openxmlformats.org/presentationml/2006/main">
+  <p:cSld>
+    <p:spTree>
+      <p:nvGrpSpPr>
+        <p:cNvPr id="1" name=""/>
+        <p:cNvGrpSpPr/>
+        <p:nvPr/>
+      </p:nvGrpSpPr>
+      <p:grpSpPr>
+        <a:xfrm>
+          <a:off x="0" y="0"/>
+          <a:ext cx="0" cy="0"/>
+          <a:chOff x="0" y="0"/>
+          <a:chExt cx="0" cy="0"/>
+        </a:xfrm>
+      </p:grpSpPr>
+      <p:sp>
+        <p:nvSpPr>
+          <p:cNvPr id="2" name="Title 1"/>
+          <p:cNvSpPr>
+            <a:spLocks noGrp="1"/>
+          </p:cNvSpPr>
+          <p:nvPr>
+            <p:ph type="title"/>
+          </p:nvPr>
+        </p:nvSpPr>
+        <p:spPr/>
+        <p:txBody>
+          <a:bodyPr/>
+          <a:lstStyle/>
+          <a:p>
+            <a:r>
+              <a:rPr lang="en-US" dirty="0"/>
               <a:t>User Interface - Design</a:t>
             </a:r>
           </a:p>
@@ -3480,7 +4095,7 @@
         <p:spPr/>
         <p:txBody>
           <a:bodyPr>
-            <a:normAutofit fontScale="92500" lnSpcReduction="20000"/>
+            <a:normAutofit fontScale="85000" lnSpcReduction="20000"/>
           </a:bodyPr>
           <a:lstStyle/>
           <a:p>
@@ -3524,6 +4139,13 @@
             </a:r>
           </a:p>
           <a:p>
+            <a:pPr lvl="1"/>
+            <a:r>
+              <a:rPr lang="en-US" dirty="0"/>
+              <a:t>Progress Bar for back-end simulations?</a:t>
+            </a:r>
+          </a:p>
+          <a:p>
             <a:r>
               <a:rPr lang="en-US" dirty="0"/>
               <a:t>Resizable or not?</a:t>
@@ -3552,13 +4174,8 @@
           <a:p>
             <a:r>
               <a:rPr lang="en-US" dirty="0"/>
-              <a:t>Look into QT Tab </a:t>
-            </a:r>
-            <a:r>
-              <a:rPr lang="en-US"/>
-              <a:t>Widgets for render modes?</a:t>
-            </a:r>
-            <a:endParaRPr lang="en-US" dirty="0"/>
+              <a:t>Look into QT Tab Widgets for render modes?</a:t>
+            </a:r>
           </a:p>
           <a:p>
             <a:pPr marL="0" indent="0">
@@ -3645,7 +4262,7 @@
 </p:sld>
 </file>
 
-<file path=ppt/slides/slide13.xml><?xml version="1.0" encoding="utf-8"?>
+<file path=ppt/slides/slide15.xml><?xml version="1.0" encoding="utf-8"?>
 <p:sld xmlns:a="http://schemas.openxmlformats.org/drawingml/2006/main" xmlns:r="http://schemas.openxmlformats.org/officeDocument/2006/relationships" xmlns:p="http://schemas.openxmlformats.org/presentationml/2006/main">
   <p:cSld>
     <p:spTree>
@@ -5575,7 +6192,7 @@
 </p:sld>
 </file>
 
-<file path=ppt/slides/slide14.xml><?xml version="1.0" encoding="utf-8"?>
+<file path=ppt/slides/slide16.xml><?xml version="1.0" encoding="utf-8"?>
 <p:sld xmlns:a="http://schemas.openxmlformats.org/drawingml/2006/main" xmlns:r="http://schemas.openxmlformats.org/officeDocument/2006/relationships" xmlns:p="http://schemas.openxmlformats.org/presentationml/2006/main">
   <p:cSld>
     <p:spTree>
@@ -7476,7 +8093,7 @@
 </p:sld>
 </file>
 
-<file path=ppt/slides/slide15.xml><?xml version="1.0" encoding="utf-8"?>
+<file path=ppt/slides/slide17.xml><?xml version="1.0" encoding="utf-8"?>
 <p:sld xmlns:a="http://schemas.openxmlformats.org/drawingml/2006/main" xmlns:r="http://schemas.openxmlformats.org/officeDocument/2006/relationships" xmlns:p="http://schemas.openxmlformats.org/presentationml/2006/main">
   <p:cSld>
     <p:spTree>
@@ -9127,7 +9744,7 @@
         </p:nvSpPr>
         <p:spPr>
           <a:xfrm rot="1726282">
-            <a:off x="11567669" y="-214181"/>
+            <a:off x="12204978" y="385886"/>
             <a:ext cx="1818968" cy="1681316"/>
           </a:xfrm>
           <a:prstGeom prst="star5">
@@ -9162,6 +9779,42 @@
           </a:p>
         </p:txBody>
       </p:sp>
+      <p:pic>
+        <p:nvPicPr>
+          <p:cNvPr id="16" name="Picture 15">
+            <a:extLst>
+              <a:ext uri="{FF2B5EF4-FFF2-40B4-BE49-F238E27FC236}">
+                <a16:creationId xmlns:a16="http://schemas.microsoft.com/office/drawing/2014/main" id="{543FB6F5-8E8A-4346-B3BB-05ACC348A590}"/>
+              </a:ext>
+            </a:extLst>
+          </p:cNvPr>
+          <p:cNvPicPr>
+            <a:picLocks noChangeAspect="1"/>
+          </p:cNvPicPr>
+          <p:nvPr/>
+        </p:nvPicPr>
+        <p:blipFill>
+          <a:blip r:embed="rId3">
+            <a:extLst>
+              <a:ext uri="{28A0092B-C50C-407E-A947-70E740481C1C}">
+                <a14:useLocalDpi xmlns:a14="http://schemas.microsoft.com/office/drawing/2010/main" val="0"/>
+              </a:ext>
+            </a:extLst>
+          </a:blip>
+          <a:stretch>
+            <a:fillRect/>
+          </a:stretch>
+        </p:blipFill>
+        <p:spPr>
+          <a:xfrm>
+            <a:off x="11501518" y="44545"/>
+            <a:ext cx="622814" cy="622814"/>
+          </a:xfrm>
+          <a:prstGeom prst="rect">
+            <a:avLst/>
+          </a:prstGeom>
+        </p:spPr>
+      </p:pic>
     </p:spTree>
     <p:extLst>
       <p:ext uri="{BB962C8B-B14F-4D97-AF65-F5344CB8AC3E}">
@@ -9175,7 +9828,7 @@
 </p:sld>
 </file>
 
-<file path=ppt/slides/slide16.xml><?xml version="1.0" encoding="utf-8"?>
+<file path=ppt/slides/slide18.xml><?xml version="1.0" encoding="utf-8"?>
 <p:sld xmlns:a="http://schemas.openxmlformats.org/drawingml/2006/main" xmlns:r="http://schemas.openxmlformats.org/officeDocument/2006/relationships" xmlns:p="http://schemas.openxmlformats.org/presentationml/2006/main">
   <p:cSld>
     <p:spTree>
@@ -10846,7 +11499,7 @@
 </p:sld>
 </file>
 
-<file path=ppt/slides/slide17.xml><?xml version="1.0" encoding="utf-8"?>
+<file path=ppt/slides/slide19.xml><?xml version="1.0" encoding="utf-8"?>
 <p:sld xmlns:a="http://schemas.openxmlformats.org/drawingml/2006/main" xmlns:r="http://schemas.openxmlformats.org/officeDocument/2006/relationships" xmlns:p="http://schemas.openxmlformats.org/presentationml/2006/main">
   <p:cSld>
     <p:spTree>
@@ -11031,449 +11684,6 @@
     <p:extLst>
       <p:ext uri="{BB962C8B-B14F-4D97-AF65-F5344CB8AC3E}">
         <p14:creationId xmlns:p14="http://schemas.microsoft.com/office/powerpoint/2010/main" val="2691955007"/>
-      </p:ext>
-    </p:extLst>
-  </p:cSld>
-  <p:clrMapOvr>
-    <a:masterClrMapping/>
-  </p:clrMapOvr>
-</p:sld>
-</file>
-
-<file path=ppt/slides/slide18.xml><?xml version="1.0" encoding="utf-8"?>
-<p:sld xmlns:a="http://schemas.openxmlformats.org/drawingml/2006/main" xmlns:r="http://schemas.openxmlformats.org/officeDocument/2006/relationships" xmlns:p="http://schemas.openxmlformats.org/presentationml/2006/main">
-  <p:cSld>
-    <p:spTree>
-      <p:nvGrpSpPr>
-        <p:cNvPr id="1" name=""/>
-        <p:cNvGrpSpPr/>
-        <p:nvPr/>
-      </p:nvGrpSpPr>
-      <p:grpSpPr>
-        <a:xfrm>
-          <a:off x="0" y="0"/>
-          <a:ext cx="0" cy="0"/>
-          <a:chOff x="0" y="0"/>
-          <a:chExt cx="0" cy="0"/>
-        </a:xfrm>
-      </p:grpSpPr>
-      <p:sp>
-        <p:nvSpPr>
-          <p:cNvPr id="2" name="Title 1"/>
-          <p:cNvSpPr>
-            <a:spLocks noGrp="1"/>
-          </p:cNvSpPr>
-          <p:nvPr>
-            <p:ph type="title"/>
-          </p:nvPr>
-        </p:nvSpPr>
-        <p:spPr/>
-        <p:txBody>
-          <a:bodyPr/>
-          <a:lstStyle/>
-          <a:p>
-            <a:r>
-              <a:rPr lang="en-US" dirty="0"/>
-              <a:t>Rendering the RSO</a:t>
-            </a:r>
-          </a:p>
-        </p:txBody>
-      </p:sp>
-      <p:sp>
-        <p:nvSpPr>
-          <p:cNvPr id="3" name="Content Placeholder 2"/>
-          <p:cNvSpPr>
-            <a:spLocks noGrp="1"/>
-          </p:cNvSpPr>
-          <p:nvPr>
-            <p:ph idx="1"/>
-          </p:nvPr>
-        </p:nvSpPr>
-        <p:spPr>
-          <a:xfrm>
-            <a:off x="838200" y="1690688"/>
-            <a:ext cx="10515600" cy="5005676"/>
-          </a:xfrm>
-        </p:spPr>
-        <p:txBody>
-          <a:bodyPr>
-            <a:normAutofit/>
-          </a:bodyPr>
-          <a:lstStyle/>
-          <a:p>
-            <a:pPr marL="347663" lvl="1" indent="-342900"/>
-            <a:r>
-              <a:rPr lang="en-US" dirty="0"/>
-              <a:t>Render Modes</a:t>
-            </a:r>
-          </a:p>
-          <a:p>
-            <a:pPr marL="919163" lvl="2" indent="-457200">
-              <a:buFont typeface="+mj-lt"/>
-              <a:buAutoNum type="arabicPeriod"/>
-            </a:pPr>
-            <a:r>
-              <a:rPr lang="en-US" dirty="0"/>
-              <a:t>Photometry Mode. Generates an up-close rendering to produce accurate photometry data.</a:t>
-            </a:r>
-          </a:p>
-          <a:p>
-            <a:pPr marL="919163" lvl="2" indent="-457200">
-              <a:buFont typeface="+mj-lt"/>
-              <a:buAutoNum type="arabicPeriod"/>
-            </a:pPr>
-            <a:r>
-              <a:rPr lang="en-US" dirty="0"/>
-              <a:t>OSCOM Mode. Renders up close, then uses brightness to render a “telescope view.” This view will simulate the view from OSCOM telescopes (renders stars, models telescope characteristics, etc.) </a:t>
-            </a:r>
-          </a:p>
-          <a:p>
-            <a:pPr marL="919163" lvl="2" indent="-457200">
-              <a:buFont typeface="+mj-lt"/>
-              <a:buAutoNum type="arabicPeriod"/>
-            </a:pPr>
-            <a:r>
-              <a:rPr lang="en-US" dirty="0"/>
-              <a:t>Playback: Can be applied to either rendering mode. Simulation data collected from previous runs can be used to create the rendering. (Everything works the same, but instead of generating photometry data, the recorded data is displayed live as the simulation is rendered). (Simulation data saves associated TLE as well)</a:t>
-            </a:r>
-          </a:p>
-          <a:p>
-            <a:pPr marL="461963" lvl="1" indent="-457200"/>
-            <a:r>
-              <a:rPr lang="en-US" dirty="0"/>
-              <a:t>Simulation Modes</a:t>
-            </a:r>
-          </a:p>
-          <a:p>
-            <a:pPr marL="919163" lvl="2" indent="-457200">
-              <a:buFont typeface="+mj-lt"/>
-              <a:buAutoNum type="arabicPeriod"/>
-            </a:pPr>
-            <a:r>
-              <a:rPr lang="en-US" dirty="0"/>
-              <a:t>Real-Time. Renders RSO according to simulation parameters. Calculates, records, and plots brightness in real-time. (May or may not be practical depending on whether or not the computer is fast enough (May save simulation data to a file if desired).</a:t>
-            </a:r>
-          </a:p>
-          <a:p>
-            <a:pPr marL="919163" lvl="2" indent="-457200">
-              <a:buFont typeface="+mj-lt"/>
-              <a:buAutoNum type="arabicPeriod"/>
-            </a:pPr>
-            <a:r>
-              <a:rPr lang="en-US" dirty="0"/>
-              <a:t>Back-End. Renders the simulation “off-camera” as quickly as possible. Saves simulation data to a file. (Only available for photometry mode. Wouldn’t make sense for OSCOM mode)</a:t>
-            </a:r>
-          </a:p>
-          <a:p>
-            <a:pPr marL="919163" lvl="2" indent="-457200">
-              <a:buFont typeface="+mj-lt"/>
-              <a:buAutoNum type="arabicPeriod"/>
-            </a:pPr>
-            <a:endParaRPr lang="en-US" dirty="0"/>
-          </a:p>
-          <a:p>
-            <a:pPr marL="919163" lvl="2" indent="-457200">
-              <a:buFont typeface="+mj-lt"/>
-              <a:buAutoNum type="arabicPeriod"/>
-            </a:pPr>
-            <a:endParaRPr lang="en-US" dirty="0"/>
-          </a:p>
-          <a:p>
-            <a:pPr marL="919163" lvl="2" indent="-457200">
-              <a:buFont typeface="+mj-lt"/>
-              <a:buAutoNum type="arabicPeriod"/>
-            </a:pPr>
-            <a:endParaRPr lang="en-US" dirty="0"/>
-          </a:p>
-          <a:p>
-            <a:pPr marL="919163" lvl="2" indent="-457200">
-              <a:buFont typeface="+mj-lt"/>
-              <a:buAutoNum type="arabicPeriod"/>
-            </a:pPr>
-            <a:endParaRPr lang="en-US" dirty="0"/>
-          </a:p>
-          <a:p>
-            <a:pPr marL="919163" lvl="2" indent="-457200">
-              <a:buFont typeface="+mj-lt"/>
-              <a:buAutoNum type="arabicPeriod"/>
-            </a:pPr>
-            <a:endParaRPr lang="en-US" dirty="0"/>
-          </a:p>
-        </p:txBody>
-      </p:sp>
-      <p:pic>
-        <p:nvPicPr>
-          <p:cNvPr id="4" name="Picture 3"/>
-          <p:cNvPicPr>
-            <a:picLocks noChangeAspect="1"/>
-          </p:cNvPicPr>
-          <p:nvPr/>
-        </p:nvPicPr>
-        <p:blipFill>
-          <a:blip r:embed="rId2">
-            <a:extLst>
-              <a:ext uri="{28A0092B-C50C-407E-A947-70E740481C1C}">
-                <a14:useLocalDpi xmlns:a14="http://schemas.microsoft.com/office/drawing/2010/main" val="0"/>
-              </a:ext>
-            </a:extLst>
-          </a:blip>
-          <a:stretch>
-            <a:fillRect/>
-          </a:stretch>
-        </p:blipFill>
-        <p:spPr>
-          <a:xfrm>
-            <a:off x="10416742" y="5822874"/>
-            <a:ext cx="1775258" cy="1035126"/>
-          </a:xfrm>
-          <a:prstGeom prst="rect">
-            <a:avLst/>
-          </a:prstGeom>
-        </p:spPr>
-      </p:pic>
-      <p:pic>
-        <p:nvPicPr>
-          <p:cNvPr id="5" name="Picture 4"/>
-          <p:cNvPicPr>
-            <a:picLocks noChangeAspect="1"/>
-          </p:cNvPicPr>
-          <p:nvPr/>
-        </p:nvPicPr>
-        <p:blipFill>
-          <a:blip r:embed="rId3">
-            <a:extLst>
-              <a:ext uri="{28A0092B-C50C-407E-A947-70E740481C1C}">
-                <a14:useLocalDpi xmlns:a14="http://schemas.microsoft.com/office/drawing/2010/main" val="0"/>
-              </a:ext>
-            </a:extLst>
-          </a:blip>
-          <a:stretch>
-            <a:fillRect/>
-          </a:stretch>
-        </p:blipFill>
-        <p:spPr>
-          <a:xfrm>
-            <a:off x="10501312" y="0"/>
-            <a:ext cx="1690688" cy="1690688"/>
-          </a:xfrm>
-          <a:prstGeom prst="rect">
-            <a:avLst/>
-          </a:prstGeom>
-        </p:spPr>
-      </p:pic>
-      <p:sp>
-        <p:nvSpPr>
-          <p:cNvPr id="6" name="Star: 5 Points 5">
-            <a:extLst>
-              <a:ext uri="{FF2B5EF4-FFF2-40B4-BE49-F238E27FC236}">
-                <a16:creationId xmlns:a16="http://schemas.microsoft.com/office/drawing/2014/main" id="{58190ADE-C510-4F7C-8F7F-1563568B4833}"/>
-              </a:ext>
-            </a:extLst>
-          </p:cNvPr>
-          <p:cNvSpPr/>
-          <p:nvPr/>
-        </p:nvSpPr>
-        <p:spPr>
-          <a:xfrm>
-            <a:off x="6477730" y="14604"/>
-            <a:ext cx="2334816" cy="2026606"/>
-          </a:xfrm>
-          <a:prstGeom prst="star5">
-            <a:avLst/>
-          </a:prstGeom>
-        </p:spPr>
-        <p:style>
-          <a:lnRef idx="2">
-            <a:schemeClr val="accent4">
-              <a:shade val="50000"/>
-            </a:schemeClr>
-          </a:lnRef>
-          <a:fillRef idx="1">
-            <a:schemeClr val="accent4"/>
-          </a:fillRef>
-          <a:effectRef idx="0">
-            <a:schemeClr val="accent4"/>
-          </a:effectRef>
-          <a:fontRef idx="minor">
-            <a:schemeClr val="lt1"/>
-          </a:fontRef>
-        </p:style>
-        <p:txBody>
-          <a:bodyPr rtlCol="0" anchor="ctr"/>
-          <a:lstStyle/>
-          <a:p>
-            <a:pPr algn="ctr"/>
-            <a:r>
-              <a:rPr lang="en-US" sz="1200" dirty="0"/>
-              <a:t>Important!</a:t>
-            </a:r>
-          </a:p>
-        </p:txBody>
-      </p:sp>
-    </p:spTree>
-    <p:extLst>
-      <p:ext uri="{BB962C8B-B14F-4D97-AF65-F5344CB8AC3E}">
-        <p14:creationId xmlns:p14="http://schemas.microsoft.com/office/powerpoint/2010/main" val="3727072995"/>
-      </p:ext>
-    </p:extLst>
-  </p:cSld>
-  <p:clrMapOvr>
-    <a:masterClrMapping/>
-  </p:clrMapOvr>
-</p:sld>
-</file>
-
-<file path=ppt/slides/slide19.xml><?xml version="1.0" encoding="utf-8"?>
-<p:sld xmlns:a="http://schemas.openxmlformats.org/drawingml/2006/main" xmlns:r="http://schemas.openxmlformats.org/officeDocument/2006/relationships" xmlns:p="http://schemas.openxmlformats.org/presentationml/2006/main">
-  <p:cSld>
-    <p:spTree>
-      <p:nvGrpSpPr>
-        <p:cNvPr id="1" name=""/>
-        <p:cNvGrpSpPr/>
-        <p:nvPr/>
-      </p:nvGrpSpPr>
-      <p:grpSpPr>
-        <a:xfrm>
-          <a:off x="0" y="0"/>
-          <a:ext cx="0" cy="0"/>
-          <a:chOff x="0" y="0"/>
-          <a:chExt cx="0" cy="0"/>
-        </a:xfrm>
-      </p:grpSpPr>
-      <p:sp>
-        <p:nvSpPr>
-          <p:cNvPr id="2" name="Title 1"/>
-          <p:cNvSpPr>
-            <a:spLocks noGrp="1"/>
-          </p:cNvSpPr>
-          <p:nvPr>
-            <p:ph type="title"/>
-          </p:nvPr>
-        </p:nvSpPr>
-        <p:spPr/>
-        <p:txBody>
-          <a:bodyPr/>
-          <a:lstStyle/>
-          <a:p>
-            <a:r>
-              <a:rPr lang="en-US" dirty="0"/>
-              <a:t>Modeling the RSO</a:t>
-            </a:r>
-          </a:p>
-        </p:txBody>
-      </p:sp>
-      <p:sp>
-        <p:nvSpPr>
-          <p:cNvPr id="3" name="Content Placeholder 2"/>
-          <p:cNvSpPr>
-            <a:spLocks noGrp="1"/>
-          </p:cNvSpPr>
-          <p:nvPr>
-            <p:ph idx="1"/>
-          </p:nvPr>
-        </p:nvSpPr>
-        <p:spPr/>
-        <p:txBody>
-          <a:bodyPr>
-            <a:normAutofit/>
-          </a:bodyPr>
-          <a:lstStyle/>
-          <a:p>
-            <a:r>
-              <a:rPr lang="en-US" dirty="0"/>
-              <a:t>Import CAD models to COMPASS directly using common vertex-based model formats. (STL, OBJ, and AMF)</a:t>
-            </a:r>
-          </a:p>
-          <a:p>
-            <a:r>
-              <a:rPr lang="en-US" dirty="0"/>
-              <a:t>Use Blender to import CAD models and apply colors/textures/material properties/Surface normal/etc. Export blender models into COMPASS</a:t>
-            </a:r>
-          </a:p>
-          <a:p>
-            <a:r>
-              <a:rPr lang="en-US" dirty="0"/>
-              <a:t>Use CAD models from SAIL CubeSats or Spacecraft Development Club’s RADSat.</a:t>
-            </a:r>
-          </a:p>
-          <a:p>
-            <a:r>
-              <a:rPr lang="en-US" dirty="0"/>
-              <a:t>NASA has various satellite models publicly available. Use for testing.</a:t>
-            </a:r>
-          </a:p>
-          <a:p>
-            <a:pPr marL="0" indent="0">
-              <a:buNone/>
-            </a:pPr>
-            <a:endParaRPr lang="en-US" dirty="0"/>
-          </a:p>
-        </p:txBody>
-      </p:sp>
-      <p:pic>
-        <p:nvPicPr>
-          <p:cNvPr id="4" name="Picture 3"/>
-          <p:cNvPicPr>
-            <a:picLocks noChangeAspect="1"/>
-          </p:cNvPicPr>
-          <p:nvPr/>
-        </p:nvPicPr>
-        <p:blipFill>
-          <a:blip r:embed="rId2">
-            <a:extLst>
-              <a:ext uri="{28A0092B-C50C-407E-A947-70E740481C1C}">
-                <a14:useLocalDpi xmlns:a14="http://schemas.microsoft.com/office/drawing/2010/main" val="0"/>
-              </a:ext>
-            </a:extLst>
-          </a:blip>
-          <a:stretch>
-            <a:fillRect/>
-          </a:stretch>
-        </p:blipFill>
-        <p:spPr>
-          <a:xfrm>
-            <a:off x="10416742" y="5822874"/>
-            <a:ext cx="1775258" cy="1035126"/>
-          </a:xfrm>
-          <a:prstGeom prst="rect">
-            <a:avLst/>
-          </a:prstGeom>
-        </p:spPr>
-      </p:pic>
-      <p:pic>
-        <p:nvPicPr>
-          <p:cNvPr id="5" name="Picture 4"/>
-          <p:cNvPicPr>
-            <a:picLocks noChangeAspect="1"/>
-          </p:cNvPicPr>
-          <p:nvPr/>
-        </p:nvPicPr>
-        <p:blipFill>
-          <a:blip r:embed="rId3">
-            <a:extLst>
-              <a:ext uri="{28A0092B-C50C-407E-A947-70E740481C1C}">
-                <a14:useLocalDpi xmlns:a14="http://schemas.microsoft.com/office/drawing/2010/main" val="0"/>
-              </a:ext>
-            </a:extLst>
-          </a:blip>
-          <a:stretch>
-            <a:fillRect/>
-          </a:stretch>
-        </p:blipFill>
-        <p:spPr>
-          <a:xfrm>
-            <a:off x="10501312" y="0"/>
-            <a:ext cx="1690688" cy="1690688"/>
-          </a:xfrm>
-          <a:prstGeom prst="rect">
-            <a:avLst/>
-          </a:prstGeom>
-        </p:spPr>
-      </p:pic>
-    </p:spTree>
-    <p:extLst>
-      <p:ext uri="{BB962C8B-B14F-4D97-AF65-F5344CB8AC3E}">
-        <p14:creationId xmlns:p14="http://schemas.microsoft.com/office/powerpoint/2010/main" val="1692999073"/>
       </p:ext>
     </p:extLst>
   </p:cSld>
@@ -12547,6 +12757,455 @@
           <a:p>
             <a:r>
               <a:rPr lang="en-US" dirty="0"/>
+              <a:t>Rendering the RSO</a:t>
+            </a:r>
+          </a:p>
+        </p:txBody>
+      </p:sp>
+      <p:sp>
+        <p:nvSpPr>
+          <p:cNvPr id="3" name="Content Placeholder 2"/>
+          <p:cNvSpPr>
+            <a:spLocks noGrp="1"/>
+          </p:cNvSpPr>
+          <p:nvPr>
+            <p:ph idx="1"/>
+          </p:nvPr>
+        </p:nvSpPr>
+        <p:spPr>
+          <a:xfrm>
+            <a:off x="838200" y="1690688"/>
+            <a:ext cx="10515600" cy="5005676"/>
+          </a:xfrm>
+        </p:spPr>
+        <p:txBody>
+          <a:bodyPr>
+            <a:normAutofit lnSpcReduction="10000"/>
+          </a:bodyPr>
+          <a:lstStyle/>
+          <a:p>
+            <a:pPr marL="347663" lvl="1" indent="-342900"/>
+            <a:r>
+              <a:rPr lang="en-US" dirty="0"/>
+              <a:t>Render Modes</a:t>
+            </a:r>
+          </a:p>
+          <a:p>
+            <a:pPr marL="919163" lvl="2" indent="-457200">
+              <a:buFont typeface="+mj-lt"/>
+              <a:buAutoNum type="arabicPeriod"/>
+            </a:pPr>
+            <a:r>
+              <a:rPr lang="en-US" dirty="0"/>
+              <a:t>Photometry Mode. Generates an up-close rendering to produce accurate photometry data.</a:t>
+            </a:r>
+          </a:p>
+          <a:p>
+            <a:pPr marL="919163" lvl="2" indent="-457200">
+              <a:buFont typeface="+mj-lt"/>
+              <a:buAutoNum type="arabicPeriod"/>
+            </a:pPr>
+            <a:r>
+              <a:rPr lang="en-US" dirty="0"/>
+              <a:t>OSCOM Mode. Renders up close, then uses brightness to render a “telescope view.” This view will simulate the view from OSCOM telescopes (renders stars, models telescope characteristics, etc.) </a:t>
+            </a:r>
+          </a:p>
+          <a:p>
+            <a:pPr marL="919163" lvl="2" indent="-457200">
+              <a:buFont typeface="+mj-lt"/>
+              <a:buAutoNum type="arabicPeriod"/>
+            </a:pPr>
+            <a:r>
+              <a:rPr lang="en-US" dirty="0"/>
+              <a:t>Playback: Can be applied to either rendering mode. Simulation data collected from previous runs can be used to create the rendering. (Everything works the same, but instead of generating photometry data, the recorded data is displayed live as the simulation is rendered). (Simulation data saves associated TLE as well)</a:t>
+            </a:r>
+          </a:p>
+          <a:p>
+            <a:pPr marL="461963" lvl="1" indent="-457200"/>
+            <a:r>
+              <a:rPr lang="en-US" dirty="0"/>
+              <a:t>Simulation Modes</a:t>
+            </a:r>
+          </a:p>
+          <a:p>
+            <a:pPr marL="919163" lvl="2" indent="-457200">
+              <a:buFont typeface="+mj-lt"/>
+              <a:buAutoNum type="arabicPeriod"/>
+            </a:pPr>
+            <a:r>
+              <a:rPr lang="en-US" dirty="0"/>
+              <a:t>Real-Time. Renders RSO according to simulation parameters. Calculates, records, and plots brightness in real-time. (May or may not be practical depending on whether or not the computer is fast enough (May save simulation data to a file if desired). If real-time, don’t allow the user to move the camera.</a:t>
+            </a:r>
+          </a:p>
+          <a:p>
+            <a:pPr marL="919163" lvl="2" indent="-457200">
+              <a:buFont typeface="+mj-lt"/>
+              <a:buAutoNum type="arabicPeriod"/>
+            </a:pPr>
+            <a:r>
+              <a:rPr lang="en-US" dirty="0"/>
+              <a:t>Back-End. Renders the simulation “off-camera” as quickly as possible. Saves simulation data to a file. (Only available for photometry mode. Wouldn’t make sense for OSCOM mode)</a:t>
+            </a:r>
+          </a:p>
+          <a:p>
+            <a:pPr marL="919163" lvl="2" indent="-457200">
+              <a:buFont typeface="+mj-lt"/>
+              <a:buAutoNum type="arabicPeriod"/>
+            </a:pPr>
+            <a:endParaRPr lang="en-US" dirty="0"/>
+          </a:p>
+          <a:p>
+            <a:pPr marL="919163" lvl="2" indent="-457200">
+              <a:buFont typeface="+mj-lt"/>
+              <a:buAutoNum type="arabicPeriod"/>
+            </a:pPr>
+            <a:endParaRPr lang="en-US" dirty="0"/>
+          </a:p>
+          <a:p>
+            <a:pPr marL="919163" lvl="2" indent="-457200">
+              <a:buFont typeface="+mj-lt"/>
+              <a:buAutoNum type="arabicPeriod"/>
+            </a:pPr>
+            <a:endParaRPr lang="en-US" dirty="0"/>
+          </a:p>
+          <a:p>
+            <a:pPr marL="919163" lvl="2" indent="-457200">
+              <a:buFont typeface="+mj-lt"/>
+              <a:buAutoNum type="arabicPeriod"/>
+            </a:pPr>
+            <a:endParaRPr lang="en-US" dirty="0"/>
+          </a:p>
+          <a:p>
+            <a:pPr marL="919163" lvl="2" indent="-457200">
+              <a:buFont typeface="+mj-lt"/>
+              <a:buAutoNum type="arabicPeriod"/>
+            </a:pPr>
+            <a:endParaRPr lang="en-US" dirty="0"/>
+          </a:p>
+        </p:txBody>
+      </p:sp>
+      <p:pic>
+        <p:nvPicPr>
+          <p:cNvPr id="4" name="Picture 3"/>
+          <p:cNvPicPr>
+            <a:picLocks noChangeAspect="1"/>
+          </p:cNvPicPr>
+          <p:nvPr/>
+        </p:nvPicPr>
+        <p:blipFill>
+          <a:blip r:embed="rId2">
+            <a:extLst>
+              <a:ext uri="{28A0092B-C50C-407E-A947-70E740481C1C}">
+                <a14:useLocalDpi xmlns:a14="http://schemas.microsoft.com/office/drawing/2010/main" val="0"/>
+              </a:ext>
+            </a:extLst>
+          </a:blip>
+          <a:stretch>
+            <a:fillRect/>
+          </a:stretch>
+        </p:blipFill>
+        <p:spPr>
+          <a:xfrm>
+            <a:off x="10416742" y="5822874"/>
+            <a:ext cx="1775258" cy="1035126"/>
+          </a:xfrm>
+          <a:prstGeom prst="rect">
+            <a:avLst/>
+          </a:prstGeom>
+        </p:spPr>
+      </p:pic>
+      <p:pic>
+        <p:nvPicPr>
+          <p:cNvPr id="5" name="Picture 4"/>
+          <p:cNvPicPr>
+            <a:picLocks noChangeAspect="1"/>
+          </p:cNvPicPr>
+          <p:nvPr/>
+        </p:nvPicPr>
+        <p:blipFill>
+          <a:blip r:embed="rId3">
+            <a:extLst>
+              <a:ext uri="{28A0092B-C50C-407E-A947-70E740481C1C}">
+                <a14:useLocalDpi xmlns:a14="http://schemas.microsoft.com/office/drawing/2010/main" val="0"/>
+              </a:ext>
+            </a:extLst>
+          </a:blip>
+          <a:stretch>
+            <a:fillRect/>
+          </a:stretch>
+        </p:blipFill>
+        <p:spPr>
+          <a:xfrm>
+            <a:off x="10501312" y="0"/>
+            <a:ext cx="1690688" cy="1690688"/>
+          </a:xfrm>
+          <a:prstGeom prst="rect">
+            <a:avLst/>
+          </a:prstGeom>
+        </p:spPr>
+      </p:pic>
+      <p:sp>
+        <p:nvSpPr>
+          <p:cNvPr id="6" name="Star: 5 Points 5">
+            <a:extLst>
+              <a:ext uri="{FF2B5EF4-FFF2-40B4-BE49-F238E27FC236}">
+                <a16:creationId xmlns:a16="http://schemas.microsoft.com/office/drawing/2014/main" id="{58190ADE-C510-4F7C-8F7F-1563568B4833}"/>
+              </a:ext>
+            </a:extLst>
+          </p:cNvPr>
+          <p:cNvSpPr/>
+          <p:nvPr/>
+        </p:nvSpPr>
+        <p:spPr>
+          <a:xfrm>
+            <a:off x="6477730" y="14604"/>
+            <a:ext cx="2334816" cy="2026606"/>
+          </a:xfrm>
+          <a:prstGeom prst="star5">
+            <a:avLst/>
+          </a:prstGeom>
+        </p:spPr>
+        <p:style>
+          <a:lnRef idx="2">
+            <a:schemeClr val="accent4">
+              <a:shade val="50000"/>
+            </a:schemeClr>
+          </a:lnRef>
+          <a:fillRef idx="1">
+            <a:schemeClr val="accent4"/>
+          </a:fillRef>
+          <a:effectRef idx="0">
+            <a:schemeClr val="accent4"/>
+          </a:effectRef>
+          <a:fontRef idx="minor">
+            <a:schemeClr val="lt1"/>
+          </a:fontRef>
+        </p:style>
+        <p:txBody>
+          <a:bodyPr rtlCol="0" anchor="ctr"/>
+          <a:lstStyle/>
+          <a:p>
+            <a:pPr algn="ctr"/>
+            <a:r>
+              <a:rPr lang="en-US" sz="1200" dirty="0"/>
+              <a:t>Important!</a:t>
+            </a:r>
+          </a:p>
+        </p:txBody>
+      </p:sp>
+    </p:spTree>
+    <p:extLst>
+      <p:ext uri="{BB962C8B-B14F-4D97-AF65-F5344CB8AC3E}">
+        <p14:creationId xmlns:p14="http://schemas.microsoft.com/office/powerpoint/2010/main" val="3727072995"/>
+      </p:ext>
+    </p:extLst>
+  </p:cSld>
+  <p:clrMapOvr>
+    <a:masterClrMapping/>
+  </p:clrMapOvr>
+</p:sld>
+</file>
+
+<file path=ppt/slides/slide21.xml><?xml version="1.0" encoding="utf-8"?>
+<p:sld xmlns:a="http://schemas.openxmlformats.org/drawingml/2006/main" xmlns:r="http://schemas.openxmlformats.org/officeDocument/2006/relationships" xmlns:p="http://schemas.openxmlformats.org/presentationml/2006/main">
+  <p:cSld>
+    <p:spTree>
+      <p:nvGrpSpPr>
+        <p:cNvPr id="1" name=""/>
+        <p:cNvGrpSpPr/>
+        <p:nvPr/>
+      </p:nvGrpSpPr>
+      <p:grpSpPr>
+        <a:xfrm>
+          <a:off x="0" y="0"/>
+          <a:ext cx="0" cy="0"/>
+          <a:chOff x="0" y="0"/>
+          <a:chExt cx="0" cy="0"/>
+        </a:xfrm>
+      </p:grpSpPr>
+      <p:sp>
+        <p:nvSpPr>
+          <p:cNvPr id="2" name="Title 1"/>
+          <p:cNvSpPr>
+            <a:spLocks noGrp="1"/>
+          </p:cNvSpPr>
+          <p:nvPr>
+            <p:ph type="title"/>
+          </p:nvPr>
+        </p:nvSpPr>
+        <p:spPr/>
+        <p:txBody>
+          <a:bodyPr/>
+          <a:lstStyle/>
+          <a:p>
+            <a:r>
+              <a:rPr lang="en-US" dirty="0"/>
+              <a:t>Modeling the RSO</a:t>
+            </a:r>
+          </a:p>
+        </p:txBody>
+      </p:sp>
+      <p:sp>
+        <p:nvSpPr>
+          <p:cNvPr id="3" name="Content Placeholder 2"/>
+          <p:cNvSpPr>
+            <a:spLocks noGrp="1"/>
+          </p:cNvSpPr>
+          <p:nvPr>
+            <p:ph idx="1"/>
+          </p:nvPr>
+        </p:nvSpPr>
+        <p:spPr/>
+        <p:txBody>
+          <a:bodyPr>
+            <a:normAutofit fontScale="92500"/>
+          </a:bodyPr>
+          <a:lstStyle/>
+          <a:p>
+            <a:r>
+              <a:rPr lang="en-US" dirty="0"/>
+              <a:t>Import CAD models to COMPASS directly using common vertex-based model formats. (STL, OBJ, and AMF)</a:t>
+            </a:r>
+          </a:p>
+          <a:p>
+            <a:r>
+              <a:rPr lang="en-US" dirty="0"/>
+              <a:t>Use Blender to import CAD models and apply colors/textures/material properties/Surface normal/etc. Export blender models into COMPASS</a:t>
+            </a:r>
+          </a:p>
+          <a:p>
+            <a:r>
+              <a:rPr lang="en-US" dirty="0"/>
+              <a:t>Use CAD models from SAIL CubeSats or Spacecraft Development Club’s RADSat.</a:t>
+            </a:r>
+          </a:p>
+          <a:p>
+            <a:r>
+              <a:rPr lang="en-US" dirty="0"/>
+              <a:t>NASA has various satellite models publicly available. Use for testing.</a:t>
+            </a:r>
+          </a:p>
+          <a:p>
+            <a:r>
+              <a:rPr lang="en-US" dirty="0"/>
+              <a:t>Have object files that contain the mesh, settings for the zoom amount based on satellite size, maintain different configuration models (e.g. solar panels retracted, antenna out, blah blah blah) etc…</a:t>
+            </a:r>
+          </a:p>
+          <a:p>
+            <a:pPr marL="0" indent="0">
+              <a:buNone/>
+            </a:pPr>
+            <a:endParaRPr lang="en-US" dirty="0"/>
+          </a:p>
+        </p:txBody>
+      </p:sp>
+      <p:pic>
+        <p:nvPicPr>
+          <p:cNvPr id="4" name="Picture 3"/>
+          <p:cNvPicPr>
+            <a:picLocks noChangeAspect="1"/>
+          </p:cNvPicPr>
+          <p:nvPr/>
+        </p:nvPicPr>
+        <p:blipFill>
+          <a:blip r:embed="rId2">
+            <a:extLst>
+              <a:ext uri="{28A0092B-C50C-407E-A947-70E740481C1C}">
+                <a14:useLocalDpi xmlns:a14="http://schemas.microsoft.com/office/drawing/2010/main" val="0"/>
+              </a:ext>
+            </a:extLst>
+          </a:blip>
+          <a:stretch>
+            <a:fillRect/>
+          </a:stretch>
+        </p:blipFill>
+        <p:spPr>
+          <a:xfrm>
+            <a:off x="10416742" y="5822874"/>
+            <a:ext cx="1775258" cy="1035126"/>
+          </a:xfrm>
+          <a:prstGeom prst="rect">
+            <a:avLst/>
+          </a:prstGeom>
+        </p:spPr>
+      </p:pic>
+      <p:pic>
+        <p:nvPicPr>
+          <p:cNvPr id="5" name="Picture 4"/>
+          <p:cNvPicPr>
+            <a:picLocks noChangeAspect="1"/>
+          </p:cNvPicPr>
+          <p:nvPr/>
+        </p:nvPicPr>
+        <p:blipFill>
+          <a:blip r:embed="rId3">
+            <a:extLst>
+              <a:ext uri="{28A0092B-C50C-407E-A947-70E740481C1C}">
+                <a14:useLocalDpi xmlns:a14="http://schemas.microsoft.com/office/drawing/2010/main" val="0"/>
+              </a:ext>
+            </a:extLst>
+          </a:blip>
+          <a:stretch>
+            <a:fillRect/>
+          </a:stretch>
+        </p:blipFill>
+        <p:spPr>
+          <a:xfrm>
+            <a:off x="10501312" y="0"/>
+            <a:ext cx="1690688" cy="1690688"/>
+          </a:xfrm>
+          <a:prstGeom prst="rect">
+            <a:avLst/>
+          </a:prstGeom>
+        </p:spPr>
+      </p:pic>
+    </p:spTree>
+    <p:extLst>
+      <p:ext uri="{BB962C8B-B14F-4D97-AF65-F5344CB8AC3E}">
+        <p14:creationId xmlns:p14="http://schemas.microsoft.com/office/powerpoint/2010/main" val="1692999073"/>
+      </p:ext>
+    </p:extLst>
+  </p:cSld>
+  <p:clrMapOvr>
+    <a:masterClrMapping/>
+  </p:clrMapOvr>
+</p:sld>
+</file>
+
+<file path=ppt/slides/slide22.xml><?xml version="1.0" encoding="utf-8"?>
+<p:sld xmlns:a="http://schemas.openxmlformats.org/drawingml/2006/main" xmlns:r="http://schemas.openxmlformats.org/officeDocument/2006/relationships" xmlns:p="http://schemas.openxmlformats.org/presentationml/2006/main">
+  <p:cSld>
+    <p:spTree>
+      <p:nvGrpSpPr>
+        <p:cNvPr id="1" name=""/>
+        <p:cNvGrpSpPr/>
+        <p:nvPr/>
+      </p:nvGrpSpPr>
+      <p:grpSpPr>
+        <a:xfrm>
+          <a:off x="0" y="0"/>
+          <a:ext cx="0" cy="0"/>
+          <a:chOff x="0" y="0"/>
+          <a:chExt cx="0" cy="0"/>
+        </a:xfrm>
+      </p:grpSpPr>
+      <p:sp>
+        <p:nvSpPr>
+          <p:cNvPr id="2" name="Title 1"/>
+          <p:cNvSpPr>
+            <a:spLocks noGrp="1"/>
+          </p:cNvSpPr>
+          <p:nvPr>
+            <p:ph type="title"/>
+          </p:nvPr>
+        </p:nvSpPr>
+        <p:spPr/>
+        <p:txBody>
+          <a:bodyPr/>
+          <a:lstStyle/>
+          <a:p>
+            <a:r>
+              <a:rPr lang="en-US" dirty="0"/>
               <a:t>Rendering the Environment</a:t>
             </a:r>
           </a:p>
@@ -12681,7 +13340,7 @@
 </p:sld>
 </file>
 
-<file path=ppt/slides/slide21.xml><?xml version="1.0" encoding="utf-8"?>
+<file path=ppt/slides/slide23.xml><?xml version="1.0" encoding="utf-8"?>
 <p:sld xmlns:a="http://schemas.openxmlformats.org/drawingml/2006/main" xmlns:r="http://schemas.openxmlformats.org/officeDocument/2006/relationships" xmlns:p="http://schemas.openxmlformats.org/presentationml/2006/main">
   <p:cSld>
     <p:spTree>
@@ -12844,7 +13503,7 @@
 </p:sld>
 </file>
 
-<file path=ppt/slides/slide22.xml><?xml version="1.0" encoding="utf-8"?>
+<file path=ppt/slides/slide24.xml><?xml version="1.0" encoding="utf-8"?>
 <p:sld xmlns:a="http://schemas.openxmlformats.org/drawingml/2006/main" xmlns:r="http://schemas.openxmlformats.org/officeDocument/2006/relationships" xmlns:p="http://schemas.openxmlformats.org/presentationml/2006/main">
   <p:cSld>
     <p:spTree>
@@ -12986,7 +13645,7 @@
 </p:sld>
 </file>
 
-<file path=ppt/slides/slide23.xml><?xml version="1.0" encoding="utf-8"?>
+<file path=ppt/slides/slide25.xml><?xml version="1.0" encoding="utf-8"?>
 <p:sld xmlns:a="http://schemas.openxmlformats.org/drawingml/2006/main" xmlns:r="http://schemas.openxmlformats.org/officeDocument/2006/relationships" xmlns:p="http://schemas.openxmlformats.org/presentationml/2006/main">
   <p:cSld>
     <p:spTree>
@@ -13125,7 +13784,7 @@
 </p:sld>
 </file>
 
-<file path=ppt/slides/slide24.xml><?xml version="1.0" encoding="utf-8"?>
+<file path=ppt/slides/slide26.xml><?xml version="1.0" encoding="utf-8"?>
 <p:sld xmlns:a="http://schemas.openxmlformats.org/drawingml/2006/main" xmlns:r="http://schemas.openxmlformats.org/officeDocument/2006/relationships" xmlns:p="http://schemas.openxmlformats.org/presentationml/2006/main">
   <p:cSld>
     <p:spTree>
@@ -13247,7 +13906,7 @@
 </p:sld>
 </file>
 
-<file path=ppt/slides/slide25.xml><?xml version="1.0" encoding="utf-8"?>
+<file path=ppt/slides/slide27.xml><?xml version="1.0" encoding="utf-8"?>
 <p:sld xmlns:a="http://schemas.openxmlformats.org/drawingml/2006/main" xmlns:r="http://schemas.openxmlformats.org/officeDocument/2006/relationships" xmlns:p="http://schemas.openxmlformats.org/presentationml/2006/main">
   <p:cSld>
     <p:spTree>
@@ -13872,7 +14531,7 @@
 </p:sld>
 </file>
 
-<file path=ppt/slides/slide26.xml><?xml version="1.0" encoding="utf-8"?>
+<file path=ppt/slides/slide28.xml><?xml version="1.0" encoding="utf-8"?>
 <p:sld xmlns:a="http://schemas.openxmlformats.org/drawingml/2006/main" xmlns:r="http://schemas.openxmlformats.org/officeDocument/2006/relationships" xmlns:p="http://schemas.openxmlformats.org/presentationml/2006/main">
   <p:cSld>
     <p:spTree>
@@ -13991,7 +14650,7 @@
           <p:nvPr>
             <p:extLst>
               <p:ext uri="{D42A27DB-BD31-4B8C-83A1-F6EECF244321}">
-                <p14:modId xmlns:p14="http://schemas.microsoft.com/office/powerpoint/2010/main" val="2309406023"/>
+                <p14:modId xmlns:p14="http://schemas.microsoft.com/office/powerpoint/2010/main" val="3203990492"/>
               </p:ext>
             </p:extLst>
           </p:nvPr>
@@ -14258,17 +14917,29 @@
                     <a:bodyPr/>
                     <a:lstStyle/>
                     <a:p>
-                      <a:endParaRPr lang="en-US" sz="1200" dirty="0"/>
-                    </a:p>
-                  </a:txBody>
-                  <a:tcPr/>
-                </a:tc>
-                <a:tc>
-                  <a:txBody>
-                    <a:bodyPr/>
-                    <a:lstStyle/>
-                    <a:p>
-                      <a:endParaRPr lang="en-US" sz="1200" dirty="0"/>
+                      <a:r>
+                        <a:rPr lang="en-US" sz="1200" dirty="0"/>
+                        <a:t>QT Style Sheets</a:t>
+                      </a:r>
+                    </a:p>
+                  </a:txBody>
+                  <a:tcPr/>
+                </a:tc>
+                <a:tc>
+                  <a:txBody>
+                    <a:bodyPr/>
+                    <a:lstStyle/>
+                    <a:p>
+                      <a:r>
+                        <a:rPr lang="en-US" sz="1200" dirty="0">
+                          <a:hlinkClick r:id="rId9"/>
+                        </a:rPr>
+                        <a:t>http://doc.qt.io/qt-4.8/stylesheet.html</a:t>
+                      </a:r>
+                      <a:r>
+                        <a:rPr lang="en-US" sz="1200" dirty="0"/>
+                        <a:t> </a:t>
+                      </a:r>
                     </a:p>
                   </a:txBody>
                   <a:tcPr/>
@@ -14485,7 +15156,7 @@
 </p:sld>
 </file>
 
-<file path=ppt/slides/slide27.xml><?xml version="1.0" encoding="utf-8"?>
+<file path=ppt/slides/slide29.xml><?xml version="1.0" encoding="utf-8"?>
 <p:sld xmlns:a="http://schemas.openxmlformats.org/drawingml/2006/main" xmlns:r="http://schemas.openxmlformats.org/officeDocument/2006/relationships" xmlns:p="http://schemas.openxmlformats.org/presentationml/2006/main">
   <p:cSld>
     <p:spTree>
@@ -16720,7 +17391,7 @@
           <p:nvPr>
             <p:extLst>
               <p:ext uri="{D42A27DB-BD31-4B8C-83A1-F6EECF244321}">
-                <p14:modId xmlns:p14="http://schemas.microsoft.com/office/powerpoint/2010/main" val="3501697797"/>
+                <p14:modId xmlns:p14="http://schemas.microsoft.com/office/powerpoint/2010/main" val="727412052"/>
               </p:ext>
             </p:extLst>
           </p:nvPr>
@@ -17227,27 +17898,42 @@
                     <a:bodyPr/>
                     <a:lstStyle/>
                     <a:p>
-                      <a:endParaRPr lang="en-US" sz="1200" dirty="0"/>
-                    </a:p>
-                  </a:txBody>
-                  <a:tcPr/>
-                </a:tc>
-                <a:tc>
-                  <a:txBody>
-                    <a:bodyPr/>
-                    <a:lstStyle/>
-                    <a:p>
-                      <a:endParaRPr lang="en-US" sz="1200" dirty="0"/>
-                    </a:p>
-                  </a:txBody>
-                  <a:tcPr/>
-                </a:tc>
-                <a:tc>
-                  <a:txBody>
-                    <a:bodyPr/>
-                    <a:lstStyle/>
-                    <a:p>
-                      <a:endParaRPr lang="en-US" sz="1200" dirty="0"/>
+                      <a:r>
+                        <a:rPr lang="en-US" sz="1200" dirty="0"/>
+                        <a:t>Make toolbox fit contents</a:t>
+                      </a:r>
+                    </a:p>
+                  </a:txBody>
+                  <a:tcPr/>
+                </a:tc>
+                <a:tc>
+                  <a:txBody>
+                    <a:bodyPr/>
+                    <a:lstStyle/>
+                    <a:p>
+                      <a:r>
+                        <a:rPr lang="en-US" sz="800" dirty="0">
+                          <a:hlinkClick r:id="rId4"/>
+                        </a:rPr>
+                        <a:t>https://stackoverflow.com/questions/18575656/with-qtoolbox-which-setting-to-have-page-be-only-its-content-size</a:t>
+                      </a:r>
+                      <a:r>
+                        <a:rPr lang="en-US" sz="800" dirty="0"/>
+                        <a:t> </a:t>
+                      </a:r>
+                    </a:p>
+                  </a:txBody>
+                  <a:tcPr/>
+                </a:tc>
+                <a:tc>
+                  <a:txBody>
+                    <a:bodyPr/>
+                    <a:lstStyle/>
+                    <a:p>
+                      <a:r>
+                        <a:rPr lang="en-US" sz="1200" dirty="0"/>
+                        <a:t>Low</a:t>
+                      </a:r>
                     </a:p>
                   </a:txBody>
                   <a:tcPr/>
@@ -17264,27 +17950,36 @@
                     <a:bodyPr/>
                     <a:lstStyle/>
                     <a:p>
-                      <a:endParaRPr lang="en-US" sz="1200"/>
-                    </a:p>
-                  </a:txBody>
-                  <a:tcPr/>
-                </a:tc>
-                <a:tc>
-                  <a:txBody>
-                    <a:bodyPr/>
-                    <a:lstStyle/>
-                    <a:p>
-                      <a:endParaRPr lang="en-US" sz="1200" dirty="0"/>
-                    </a:p>
-                  </a:txBody>
-                  <a:tcPr/>
-                </a:tc>
-                <a:tc>
-                  <a:txBody>
-                    <a:bodyPr/>
-                    <a:lstStyle/>
-                    <a:p>
-                      <a:endParaRPr lang="en-US" sz="1200" dirty="0"/>
+                      <a:r>
+                        <a:rPr lang="en-US" sz="1200" dirty="0"/>
+                        <a:t>Lock AR and make resizable</a:t>
+                      </a:r>
+                    </a:p>
+                  </a:txBody>
+                  <a:tcPr/>
+                </a:tc>
+                <a:tc>
+                  <a:txBody>
+                    <a:bodyPr/>
+                    <a:lstStyle/>
+                    <a:p>
+                      <a:r>
+                        <a:rPr lang="en-US" sz="1200" dirty="0"/>
+                        <a:t>Lock GL aspect ratio and make window resizable</a:t>
+                      </a:r>
+                    </a:p>
+                  </a:txBody>
+                  <a:tcPr/>
+                </a:tc>
+                <a:tc>
+                  <a:txBody>
+                    <a:bodyPr/>
+                    <a:lstStyle/>
+                    <a:p>
+                      <a:r>
+                        <a:rPr lang="en-US" sz="1200" dirty="0"/>
+                        <a:t>Low</a:t>
+                      </a:r>
                     </a:p>
                   </a:txBody>
                   <a:tcPr/>
@@ -17301,27 +17996,36 @@
                     <a:bodyPr/>
                     <a:lstStyle/>
                     <a:p>
-                      <a:endParaRPr lang="en-US" sz="1200"/>
-                    </a:p>
-                  </a:txBody>
-                  <a:tcPr/>
-                </a:tc>
-                <a:tc>
-                  <a:txBody>
-                    <a:bodyPr/>
-                    <a:lstStyle/>
-                    <a:p>
-                      <a:endParaRPr lang="en-US" sz="1200" dirty="0"/>
-                    </a:p>
-                  </a:txBody>
-                  <a:tcPr/>
-                </a:tc>
-                <a:tc>
-                  <a:txBody>
-                    <a:bodyPr/>
-                    <a:lstStyle/>
-                    <a:p>
-                      <a:endParaRPr lang="en-US" sz="1200" dirty="0"/>
+                      <a:r>
+                        <a:rPr lang="en-US" sz="1200" dirty="0"/>
+                        <a:t>Preview Mode</a:t>
+                      </a:r>
+                    </a:p>
+                  </a:txBody>
+                  <a:tcPr/>
+                </a:tc>
+                <a:tc>
+                  <a:txBody>
+                    <a:bodyPr/>
+                    <a:lstStyle/>
+                    <a:p>
+                      <a:r>
+                        <a:rPr lang="en-US" sz="1200" dirty="0"/>
+                        <a:t>Create preview sim from Satellite menu with High ambient light</a:t>
+                      </a:r>
+                    </a:p>
+                  </a:txBody>
+                  <a:tcPr/>
+                </a:tc>
+                <a:tc>
+                  <a:txBody>
+                    <a:bodyPr/>
+                    <a:lstStyle/>
+                    <a:p>
+                      <a:r>
+                        <a:rPr lang="en-US" sz="1200" dirty="0"/>
+                        <a:t>Low</a:t>
+                      </a:r>
                     </a:p>
                   </a:txBody>
                   <a:tcPr/>
@@ -17338,17 +18042,23 @@
                     <a:bodyPr/>
                     <a:lstStyle/>
                     <a:p>
-                      <a:endParaRPr lang="en-US" sz="1200"/>
-                    </a:p>
-                  </a:txBody>
-                  <a:tcPr/>
-                </a:tc>
-                <a:tc>
-                  <a:txBody>
-                    <a:bodyPr/>
-                    <a:lstStyle/>
-                    <a:p>
-                      <a:endParaRPr lang="en-US" sz="1200" dirty="0"/>
+                      <a:r>
+                        <a:rPr lang="en-US" sz="1200" dirty="0"/>
+                        <a:t>Add more info to satellite menu</a:t>
+                      </a:r>
+                    </a:p>
+                  </a:txBody>
+                  <a:tcPr/>
+                </a:tc>
+                <a:tc>
+                  <a:txBody>
+                    <a:bodyPr/>
+                    <a:lstStyle/>
+                    <a:p>
+                      <a:r>
+                        <a:rPr lang="en-US" sz="1200" dirty="0"/>
+                        <a:t>Add more relevant information to the satellite menu section</a:t>
+                      </a:r>
                     </a:p>
                   </a:txBody>
                   <a:tcPr/>

</xml_diff>